<commit_message>
Partial pooling in lecture 7
</commit_message>
<xml_diff>
--- a/Lectures/Lecture 7 Hierarchial models.pptx
+++ b/Lectures/Lecture 7 Hierarchial models.pptx
@@ -5,7 +5,7 @@
     <p:sldMasterId id="2147483648" r:id="rId1"/>
   </p:sldMasterIdLst>
   <p:notesMasterIdLst>
-    <p:notesMasterId r:id="rId16"/>
+    <p:notesMasterId r:id="rId19"/>
   </p:notesMasterIdLst>
   <p:sldIdLst>
     <p:sldId id="256" r:id="rId2"/>
@@ -16,12 +16,15 @@
     <p:sldId id="690" r:id="rId7"/>
     <p:sldId id="691" r:id="rId8"/>
     <p:sldId id="692" r:id="rId9"/>
-    <p:sldId id="682" r:id="rId10"/>
-    <p:sldId id="683" r:id="rId11"/>
-    <p:sldId id="684" r:id="rId12"/>
-    <p:sldId id="685" r:id="rId13"/>
-    <p:sldId id="686" r:id="rId14"/>
-    <p:sldId id="687" r:id="rId15"/>
+    <p:sldId id="693" r:id="rId10"/>
+    <p:sldId id="694" r:id="rId11"/>
+    <p:sldId id="695" r:id="rId12"/>
+    <p:sldId id="682" r:id="rId13"/>
+    <p:sldId id="683" r:id="rId14"/>
+    <p:sldId id="684" r:id="rId15"/>
+    <p:sldId id="685" r:id="rId16"/>
+    <p:sldId id="686" r:id="rId17"/>
+    <p:sldId id="687" r:id="rId18"/>
   </p:sldIdLst>
   <p:sldSz cx="12192000" cy="6858000"/>
   <p:notesSz cx="7102475" cy="10234613"/>
@@ -210,7 +213,7 @@
           <a:p>
             <a:fld id="{9CF176CD-15D1-4787-BBAA-B7F61FF9E394}" type="datetimeFigureOut">
               <a:rPr lang="en-GB" smtClean="0"/>
-              <a:t>10/04/2025</a:t>
+              <a:t>11/04/2025</a:t>
             </a:fld>
             <a:endParaRPr lang="en-GB"/>
           </a:p>
@@ -609,7 +612,7 @@
           <a:p>
             <a:fld id="{C56CA8F5-E68A-4115-9C25-E96C286CB035}" type="datetime1">
               <a:rPr lang="en-GB" smtClean="0"/>
-              <a:t>10/04/2025</a:t>
+              <a:t>11/04/2025</a:t>
             </a:fld>
             <a:endParaRPr lang="en-GB"/>
           </a:p>
@@ -779,7 +782,7 @@
           <a:p>
             <a:fld id="{7FD65654-1D4B-4B33-B8CE-F5581D9C13AC}" type="datetime1">
               <a:rPr lang="en-GB" smtClean="0"/>
-              <a:t>10/04/2025</a:t>
+              <a:t>11/04/2025</a:t>
             </a:fld>
             <a:endParaRPr lang="en-GB"/>
           </a:p>
@@ -959,7 +962,7 @@
           <a:p>
             <a:fld id="{50B3557C-D1F8-4213-9381-806C9A51FC91}" type="datetime1">
               <a:rPr lang="en-GB" smtClean="0"/>
-              <a:t>10/04/2025</a:t>
+              <a:t>11/04/2025</a:t>
             </a:fld>
             <a:endParaRPr lang="en-GB"/>
           </a:p>
@@ -1129,7 +1132,7 @@
           <a:p>
             <a:fld id="{5EAB202B-C763-46C3-A636-9DFD853B4605}" type="datetime1">
               <a:rPr lang="en-GB" smtClean="0"/>
-              <a:t>10/04/2025</a:t>
+              <a:t>11/04/2025</a:t>
             </a:fld>
             <a:endParaRPr lang="en-GB"/>
           </a:p>
@@ -1375,7 +1378,7 @@
           <a:p>
             <a:fld id="{D381E87C-49EE-449B-BBE1-C8D9F03709E3}" type="datetime1">
               <a:rPr lang="en-GB" smtClean="0"/>
-              <a:t>10/04/2025</a:t>
+              <a:t>11/04/2025</a:t>
             </a:fld>
             <a:endParaRPr lang="en-GB"/>
           </a:p>
@@ -1607,7 +1610,7 @@
           <a:p>
             <a:fld id="{E72DF79F-283F-4921-8EFE-03DC0706D514}" type="datetime1">
               <a:rPr lang="en-GB" smtClean="0"/>
-              <a:t>10/04/2025</a:t>
+              <a:t>11/04/2025</a:t>
             </a:fld>
             <a:endParaRPr lang="en-GB"/>
           </a:p>
@@ -1974,7 +1977,7 @@
           <a:p>
             <a:fld id="{FAB6B75B-49C2-4C52-A9AA-29208F1CA2A2}" type="datetime1">
               <a:rPr lang="en-GB" smtClean="0"/>
-              <a:t>10/04/2025</a:t>
+              <a:t>11/04/2025</a:t>
             </a:fld>
             <a:endParaRPr lang="en-GB"/>
           </a:p>
@@ -2092,7 +2095,7 @@
           <a:p>
             <a:fld id="{1338CB34-9D44-4B11-81FA-362E39680C1C}" type="datetime1">
               <a:rPr lang="en-GB" smtClean="0"/>
-              <a:t>10/04/2025</a:t>
+              <a:t>11/04/2025</a:t>
             </a:fld>
             <a:endParaRPr lang="en-GB"/>
           </a:p>
@@ -2187,7 +2190,7 @@
           <a:p>
             <a:fld id="{A4CEA9AC-502E-4271-B4D2-4510E701B0BB}" type="datetime1">
               <a:rPr lang="en-GB" smtClean="0"/>
-              <a:t>10/04/2025</a:t>
+              <a:t>11/04/2025</a:t>
             </a:fld>
             <a:endParaRPr lang="en-GB"/>
           </a:p>
@@ -2464,7 +2467,7 @@
           <a:p>
             <a:fld id="{5CDFC0ED-09ED-410F-BE71-C5A0E5CAF45C}" type="datetime1">
               <a:rPr lang="en-GB" smtClean="0"/>
-              <a:t>10/04/2025</a:t>
+              <a:t>11/04/2025</a:t>
             </a:fld>
             <a:endParaRPr lang="en-GB"/>
           </a:p>
@@ -2717,7 +2720,7 @@
           <a:p>
             <a:fld id="{3BB4F426-D937-485B-A737-9052C677CC14}" type="datetime1">
               <a:rPr lang="en-GB" smtClean="0"/>
-              <a:t>10/04/2025</a:t>
+              <a:t>11/04/2025</a:t>
             </a:fld>
             <a:endParaRPr lang="en-GB"/>
           </a:p>
@@ -2930,7 +2933,7 @@
           <a:p>
             <a:fld id="{5029E2CA-F4BC-40A0-B78C-A9A7478F92E3}" type="datetime1">
               <a:rPr lang="en-GB" smtClean="0"/>
-              <a:t>10/04/2025</a:t>
+              <a:t>11/04/2025</a:t>
             </a:fld>
             <a:endParaRPr lang="en-GB"/>
           </a:p>
@@ -3426,6 +3429,969 @@
   <p:cSld>
     <p:spTree>
       <p:nvGrpSpPr>
+        <p:cNvPr id="1" name=""/>
+        <p:cNvGrpSpPr/>
+        <p:nvPr/>
+      </p:nvGrpSpPr>
+      <p:grpSpPr>
+        <a:xfrm>
+          <a:off x="0" y="0"/>
+          <a:ext cx="0" cy="0"/>
+          <a:chOff x="0" y="0"/>
+          <a:chExt cx="0" cy="0"/>
+        </a:xfrm>
+      </p:grpSpPr>
+      <p:sp>
+        <p:nvSpPr>
+          <p:cNvPr id="2" name="Title 1">
+            <a:extLst>
+              <a:ext uri="{FF2B5EF4-FFF2-40B4-BE49-F238E27FC236}">
+                <a16:creationId xmlns:a16="http://schemas.microsoft.com/office/drawing/2014/main" id="{58BC0A5E-5A97-E5F4-2CA1-5DEC00D34CDB}"/>
+              </a:ext>
+            </a:extLst>
+          </p:cNvPr>
+          <p:cNvSpPr>
+            <a:spLocks noGrp="1"/>
+          </p:cNvSpPr>
+          <p:nvPr>
+            <p:ph type="title"/>
+          </p:nvPr>
+        </p:nvSpPr>
+        <p:spPr>
+          <a:xfrm>
+            <a:off x="838200" y="365125"/>
+            <a:ext cx="10515600" cy="610183"/>
+          </a:xfrm>
+        </p:spPr>
+        <p:txBody>
+          <a:bodyPr>
+            <a:normAutofit fontScale="90000"/>
+          </a:bodyPr>
+          <a:lstStyle/>
+          <a:p>
+            <a:r>
+              <a:rPr lang="en-US" dirty="0" err="1"/>
+              <a:t>Compre</a:t>
+            </a:r>
+            <a:r>
+              <a:rPr lang="en-US" dirty="0"/>
+              <a:t> the results</a:t>
+            </a:r>
+            <a:endParaRPr lang="en-IL" dirty="0"/>
+          </a:p>
+        </p:txBody>
+      </p:sp>
+      <p:sp>
+        <p:nvSpPr>
+          <p:cNvPr id="3" name="Content Placeholder 2">
+            <a:extLst>
+              <a:ext uri="{FF2B5EF4-FFF2-40B4-BE49-F238E27FC236}">
+                <a16:creationId xmlns:a16="http://schemas.microsoft.com/office/drawing/2014/main" id="{E9A30813-72BE-0487-8B84-974BB89D5B7E}"/>
+              </a:ext>
+            </a:extLst>
+          </p:cNvPr>
+          <p:cNvSpPr>
+            <a:spLocks noGrp="1"/>
+          </p:cNvSpPr>
+          <p:nvPr>
+            <p:ph idx="1"/>
+          </p:nvPr>
+        </p:nvSpPr>
+        <p:spPr>
+          <a:xfrm>
+            <a:off x="838200" y="1073385"/>
+            <a:ext cx="10515600" cy="973559"/>
+          </a:xfrm>
+        </p:spPr>
+        <p:txBody>
+          <a:bodyPr>
+            <a:normAutofit fontScale="85000" lnSpcReduction="20000"/>
+          </a:bodyPr>
+          <a:lstStyle/>
+          <a:p>
+            <a:r>
+              <a:rPr lang="en-US" dirty="0"/>
+              <a:t>Partial pooling:</a:t>
+            </a:r>
+          </a:p>
+          <a:p>
+            <a:pPr lvl="1"/>
+            <a:r>
+              <a:rPr lang="en-US" dirty="0"/>
+              <a:t>More narrow HDIs</a:t>
+            </a:r>
+          </a:p>
+          <a:p>
+            <a:pPr lvl="1"/>
+            <a:r>
+              <a:rPr lang="en-US" dirty="0"/>
+              <a:t>Closer together</a:t>
+            </a:r>
+            <a:endParaRPr lang="en-IL" dirty="0"/>
+          </a:p>
+        </p:txBody>
+      </p:sp>
+      <p:sp>
+        <p:nvSpPr>
+          <p:cNvPr id="4" name="Slide Number Placeholder 3">
+            <a:extLst>
+              <a:ext uri="{FF2B5EF4-FFF2-40B4-BE49-F238E27FC236}">
+                <a16:creationId xmlns:a16="http://schemas.microsoft.com/office/drawing/2014/main" id="{DF5A2654-A797-5D04-09FB-9F92A3D74D49}"/>
+              </a:ext>
+            </a:extLst>
+          </p:cNvPr>
+          <p:cNvSpPr>
+            <a:spLocks noGrp="1"/>
+          </p:cNvSpPr>
+          <p:nvPr>
+            <p:ph type="sldNum" sz="quarter" idx="12"/>
+          </p:nvPr>
+        </p:nvSpPr>
+        <p:spPr/>
+        <p:txBody>
+          <a:bodyPr/>
+          <a:lstStyle/>
+          <a:p>
+            <a:fld id="{E0DC7AD3-7C2E-418B-8082-788996B615FB}" type="slidenum">
+              <a:rPr lang="en-GB" smtClean="0"/>
+              <a:t>10</a:t>
+            </a:fld>
+            <a:endParaRPr lang="en-GB"/>
+          </a:p>
+        </p:txBody>
+      </p:sp>
+      <p:pic>
+        <p:nvPicPr>
+          <p:cNvPr id="6" name="Picture 5">
+            <a:extLst>
+              <a:ext uri="{FF2B5EF4-FFF2-40B4-BE49-F238E27FC236}">
+                <a16:creationId xmlns:a16="http://schemas.microsoft.com/office/drawing/2014/main" id="{DAE9F535-0E0D-6F99-43C2-58C4E1203160}"/>
+              </a:ext>
+            </a:extLst>
+          </p:cNvPr>
+          <p:cNvPicPr>
+            <a:picLocks noChangeAspect="1"/>
+          </p:cNvPicPr>
+          <p:nvPr/>
+        </p:nvPicPr>
+        <p:blipFill>
+          <a:blip r:embed="rId2" cstate="email">
+            <a:extLst>
+              <a:ext uri="{28A0092B-C50C-407E-A947-70E740481C1C}">
+                <a14:useLocalDpi xmlns:a14="http://schemas.microsoft.com/office/drawing/2010/main" val="0"/>
+              </a:ext>
+            </a:extLst>
+          </a:blip>
+          <a:srcRect/>
+          <a:stretch/>
+        </p:blipFill>
+        <p:spPr>
+          <a:xfrm>
+            <a:off x="343677" y="2027721"/>
+            <a:ext cx="7074160" cy="4760662"/>
+          </a:xfrm>
+          <a:prstGeom prst="rect">
+            <a:avLst/>
+          </a:prstGeom>
+        </p:spPr>
+      </p:pic>
+      <p:sp>
+        <p:nvSpPr>
+          <p:cNvPr id="9" name="TextBox 8">
+            <a:extLst>
+              <a:ext uri="{FF2B5EF4-FFF2-40B4-BE49-F238E27FC236}">
+                <a16:creationId xmlns:a16="http://schemas.microsoft.com/office/drawing/2014/main" id="{418BC107-6465-0C0F-7C33-E0373833662B}"/>
+              </a:ext>
+            </a:extLst>
+          </p:cNvPr>
+          <p:cNvSpPr txBox="1"/>
+          <p:nvPr/>
+        </p:nvSpPr>
+        <p:spPr>
+          <a:xfrm>
+            <a:off x="5194818" y="1016987"/>
+            <a:ext cx="6653505" cy="830997"/>
+          </a:xfrm>
+          <a:prstGeom prst="rect">
+            <a:avLst/>
+          </a:prstGeom>
+          <a:noFill/>
+        </p:spPr>
+        <p:txBody>
+          <a:bodyPr wrap="square">
+            <a:spAutoFit/>
+          </a:bodyPr>
+          <a:lstStyle/>
+          <a:p>
+            <a:pPr>
+              <a:buNone/>
+            </a:pPr>
+            <a:r>
+              <a:rPr lang="en-US" sz="1200" b="0" dirty="0" err="1">
+                <a:solidFill>
+                  <a:srgbClr val="267F99"/>
+                </a:solidFill>
+                <a:effectLst/>
+                <a:latin typeface="Consolas" panose="020B0609020204030204" pitchFamily="49" charset="0"/>
+              </a:rPr>
+              <a:t>az</a:t>
+            </a:r>
+            <a:r>
+              <a:rPr lang="en-US" sz="1200" b="0" dirty="0" err="1">
+                <a:solidFill>
+                  <a:srgbClr val="3B3B3B"/>
+                </a:solidFill>
+                <a:effectLst/>
+                <a:latin typeface="Consolas" panose="020B0609020204030204" pitchFamily="49" charset="0"/>
+              </a:rPr>
+              <a:t>.</a:t>
+            </a:r>
+            <a:r>
+              <a:rPr lang="en-US" sz="1200" b="0" dirty="0" err="1">
+                <a:solidFill>
+                  <a:srgbClr val="795E26"/>
+                </a:solidFill>
+                <a:effectLst/>
+                <a:latin typeface="Consolas" panose="020B0609020204030204" pitchFamily="49" charset="0"/>
+              </a:rPr>
+              <a:t>plot_forest</a:t>
+            </a:r>
+            <a:r>
+              <a:rPr lang="en-US" sz="1200" b="0" dirty="0">
+                <a:solidFill>
+                  <a:srgbClr val="3B3B3B"/>
+                </a:solidFill>
+                <a:effectLst/>
+                <a:latin typeface="Consolas" panose="020B0609020204030204" pitchFamily="49" charset="0"/>
+              </a:rPr>
+              <a:t>([</a:t>
+            </a:r>
+            <a:r>
+              <a:rPr lang="en-US" sz="1200" b="0" dirty="0" err="1">
+                <a:solidFill>
+                  <a:srgbClr val="001080"/>
+                </a:solidFill>
+                <a:effectLst/>
+                <a:latin typeface="Consolas" panose="020B0609020204030204" pitchFamily="49" charset="0"/>
+              </a:rPr>
+              <a:t>idatas</a:t>
+            </a:r>
+            <a:r>
+              <a:rPr lang="en-US" sz="1200" b="0" dirty="0">
+                <a:solidFill>
+                  <a:srgbClr val="3B3B3B"/>
+                </a:solidFill>
+                <a:effectLst/>
+                <a:latin typeface="Consolas" panose="020B0609020204030204" pitchFamily="49" charset="0"/>
+              </a:rPr>
+              <a:t>[</a:t>
+            </a:r>
+            <a:r>
+              <a:rPr lang="en-US" sz="1200" b="0" dirty="0">
+                <a:solidFill>
+                  <a:srgbClr val="A31515"/>
+                </a:solidFill>
+                <a:effectLst/>
+                <a:latin typeface="Consolas" panose="020B0609020204030204" pitchFamily="49" charset="0"/>
+              </a:rPr>
+              <a:t>"</a:t>
+            </a:r>
+            <a:r>
+              <a:rPr lang="en-US" sz="1200" b="0" dirty="0" err="1">
+                <a:solidFill>
+                  <a:srgbClr val="A31515"/>
+                </a:solidFill>
+                <a:effectLst/>
+                <a:latin typeface="Consolas" panose="020B0609020204030204" pitchFamily="49" charset="0"/>
+              </a:rPr>
+              <a:t>unpooled</a:t>
+            </a:r>
+            <a:r>
+              <a:rPr lang="en-US" sz="1200" b="0" dirty="0">
+                <a:solidFill>
+                  <a:srgbClr val="A31515"/>
+                </a:solidFill>
+                <a:effectLst/>
+                <a:latin typeface="Consolas" panose="020B0609020204030204" pitchFamily="49" charset="0"/>
+              </a:rPr>
+              <a:t>"</a:t>
+            </a:r>
+            <a:r>
+              <a:rPr lang="en-US" sz="1200" b="0" dirty="0">
+                <a:solidFill>
+                  <a:srgbClr val="3B3B3B"/>
+                </a:solidFill>
+                <a:effectLst/>
+                <a:latin typeface="Consolas" panose="020B0609020204030204" pitchFamily="49" charset="0"/>
+              </a:rPr>
+              <a:t>], </a:t>
+            </a:r>
+            <a:r>
+              <a:rPr lang="en-US" sz="1200" b="0" dirty="0" err="1">
+                <a:solidFill>
+                  <a:srgbClr val="001080"/>
+                </a:solidFill>
+                <a:effectLst/>
+                <a:latin typeface="Consolas" panose="020B0609020204030204" pitchFamily="49" charset="0"/>
+              </a:rPr>
+              <a:t>idatas</a:t>
+            </a:r>
+            <a:r>
+              <a:rPr lang="en-US" sz="1200" b="0" dirty="0">
+                <a:solidFill>
+                  <a:srgbClr val="3B3B3B"/>
+                </a:solidFill>
+                <a:effectLst/>
+                <a:latin typeface="Consolas" panose="020B0609020204030204" pitchFamily="49" charset="0"/>
+              </a:rPr>
+              <a:t>[</a:t>
+            </a:r>
+            <a:r>
+              <a:rPr lang="en-US" sz="1200" b="0" dirty="0">
+                <a:solidFill>
+                  <a:srgbClr val="A31515"/>
+                </a:solidFill>
+                <a:effectLst/>
+                <a:latin typeface="Consolas" panose="020B0609020204030204" pitchFamily="49" charset="0"/>
+              </a:rPr>
+              <a:t>"partial pooling"</a:t>
+            </a:r>
+            <a:r>
+              <a:rPr lang="en-US" sz="1200" b="0" dirty="0">
+                <a:solidFill>
+                  <a:srgbClr val="3B3B3B"/>
+                </a:solidFill>
+                <a:effectLst/>
+                <a:latin typeface="Consolas" panose="020B0609020204030204" pitchFamily="49" charset="0"/>
+              </a:rPr>
+              <a:t>]], </a:t>
+            </a:r>
+          </a:p>
+          <a:p>
+            <a:pPr>
+              <a:buNone/>
+            </a:pPr>
+            <a:r>
+              <a:rPr lang="en-US" sz="1200" b="0" dirty="0">
+                <a:solidFill>
+                  <a:srgbClr val="3B3B3B"/>
+                </a:solidFill>
+                <a:effectLst/>
+                <a:latin typeface="Consolas" panose="020B0609020204030204" pitchFamily="49" charset="0"/>
+              </a:rPr>
+              <a:t>               </a:t>
+            </a:r>
+            <a:r>
+              <a:rPr lang="en-US" sz="1200" b="0" dirty="0" err="1">
+                <a:solidFill>
+                  <a:srgbClr val="001080"/>
+                </a:solidFill>
+                <a:effectLst/>
+                <a:latin typeface="Consolas" panose="020B0609020204030204" pitchFamily="49" charset="0"/>
+              </a:rPr>
+              <a:t>var_names</a:t>
+            </a:r>
+            <a:r>
+              <a:rPr lang="en-US" sz="1200" b="0" dirty="0">
+                <a:solidFill>
+                  <a:srgbClr val="000000"/>
+                </a:solidFill>
+                <a:effectLst/>
+                <a:latin typeface="Consolas" panose="020B0609020204030204" pitchFamily="49" charset="0"/>
+              </a:rPr>
+              <a:t>=</a:t>
+            </a:r>
+            <a:r>
+              <a:rPr lang="en-US" sz="1200" b="0" dirty="0">
+                <a:solidFill>
+                  <a:srgbClr val="A31515"/>
+                </a:solidFill>
+                <a:effectLst/>
+                <a:latin typeface="Consolas" panose="020B0609020204030204" pitchFamily="49" charset="0"/>
+              </a:rPr>
+              <a:t>"</a:t>
+            </a:r>
+            <a:r>
+              <a:rPr lang="el-GR" sz="1200" b="0" dirty="0">
+                <a:solidFill>
+                  <a:srgbClr val="A31515"/>
+                </a:solidFill>
+                <a:effectLst/>
+                <a:latin typeface="Consolas" panose="020B0609020204030204" pitchFamily="49" charset="0"/>
+              </a:rPr>
+              <a:t>μ"</a:t>
+            </a:r>
+            <a:r>
+              <a:rPr lang="el-GR" sz="1200" b="0" dirty="0">
+                <a:solidFill>
+                  <a:srgbClr val="3B3B3B"/>
+                </a:solidFill>
+                <a:effectLst/>
+                <a:latin typeface="Consolas" panose="020B0609020204030204" pitchFamily="49" charset="0"/>
+              </a:rPr>
+              <a:t>, </a:t>
+            </a:r>
+            <a:r>
+              <a:rPr lang="en-US" sz="1200" b="0" dirty="0" err="1">
+                <a:solidFill>
+                  <a:srgbClr val="001080"/>
+                </a:solidFill>
+                <a:effectLst/>
+                <a:latin typeface="Consolas" panose="020B0609020204030204" pitchFamily="49" charset="0"/>
+              </a:rPr>
+              <a:t>model_names</a:t>
+            </a:r>
+            <a:r>
+              <a:rPr lang="en-US" sz="1200" b="0" dirty="0">
+                <a:solidFill>
+                  <a:srgbClr val="000000"/>
+                </a:solidFill>
+                <a:effectLst/>
+                <a:latin typeface="Consolas" panose="020B0609020204030204" pitchFamily="49" charset="0"/>
+              </a:rPr>
+              <a:t>=</a:t>
+            </a:r>
+            <a:r>
+              <a:rPr lang="en-US" sz="1200" b="0" dirty="0">
+                <a:solidFill>
+                  <a:srgbClr val="3B3B3B"/>
+                </a:solidFill>
+                <a:effectLst/>
+                <a:latin typeface="Consolas" panose="020B0609020204030204" pitchFamily="49" charset="0"/>
+              </a:rPr>
+              <a:t>[</a:t>
+            </a:r>
+            <a:r>
+              <a:rPr lang="en-US" sz="1200" b="0" dirty="0">
+                <a:solidFill>
+                  <a:srgbClr val="A31515"/>
+                </a:solidFill>
+                <a:effectLst/>
+                <a:latin typeface="Consolas" panose="020B0609020204030204" pitchFamily="49" charset="0"/>
+              </a:rPr>
+              <a:t>"</a:t>
+            </a:r>
+            <a:r>
+              <a:rPr lang="en-US" sz="1200" b="0" dirty="0" err="1">
+                <a:solidFill>
+                  <a:srgbClr val="A31515"/>
+                </a:solidFill>
+                <a:effectLst/>
+                <a:latin typeface="Consolas" panose="020B0609020204030204" pitchFamily="49" charset="0"/>
+              </a:rPr>
+              <a:t>Unpooled</a:t>
+            </a:r>
+            <a:r>
+              <a:rPr lang="en-US" sz="1200" b="0" dirty="0">
+                <a:solidFill>
+                  <a:srgbClr val="A31515"/>
+                </a:solidFill>
+                <a:effectLst/>
+                <a:latin typeface="Consolas" panose="020B0609020204030204" pitchFamily="49" charset="0"/>
+              </a:rPr>
+              <a:t>"</a:t>
+            </a:r>
+            <a:r>
+              <a:rPr lang="en-US" sz="1200" b="0" dirty="0">
+                <a:solidFill>
+                  <a:srgbClr val="3B3B3B"/>
+                </a:solidFill>
+                <a:effectLst/>
+                <a:latin typeface="Consolas" panose="020B0609020204030204" pitchFamily="49" charset="0"/>
+              </a:rPr>
+              <a:t>, </a:t>
+            </a:r>
+            <a:r>
+              <a:rPr lang="en-US" sz="1200" b="0" dirty="0">
+                <a:solidFill>
+                  <a:srgbClr val="A31515"/>
+                </a:solidFill>
+                <a:effectLst/>
+                <a:latin typeface="Consolas" panose="020B0609020204030204" pitchFamily="49" charset="0"/>
+              </a:rPr>
+              <a:t>"Partial pooling"</a:t>
+            </a:r>
+            <a:r>
+              <a:rPr lang="en-US" sz="1200" b="0" dirty="0">
+                <a:solidFill>
+                  <a:srgbClr val="3B3B3B"/>
+                </a:solidFill>
+                <a:effectLst/>
+                <a:latin typeface="Consolas" panose="020B0609020204030204" pitchFamily="49" charset="0"/>
+              </a:rPr>
+              <a:t>], </a:t>
+            </a:r>
+          </a:p>
+          <a:p>
+            <a:pPr>
+              <a:buNone/>
+            </a:pPr>
+            <a:r>
+              <a:rPr lang="en-US" sz="1200" b="0" dirty="0">
+                <a:solidFill>
+                  <a:srgbClr val="3B3B3B"/>
+                </a:solidFill>
+                <a:effectLst/>
+                <a:latin typeface="Consolas" panose="020B0609020204030204" pitchFamily="49" charset="0"/>
+              </a:rPr>
+              <a:t>               </a:t>
+            </a:r>
+            <a:r>
+              <a:rPr lang="en-US" sz="1200" b="0" dirty="0">
+                <a:solidFill>
+                  <a:srgbClr val="001080"/>
+                </a:solidFill>
+                <a:effectLst/>
+                <a:latin typeface="Consolas" panose="020B0609020204030204" pitchFamily="49" charset="0"/>
+              </a:rPr>
+              <a:t>kind</a:t>
+            </a:r>
+            <a:r>
+              <a:rPr lang="en-US" sz="1200" b="0" dirty="0">
+                <a:solidFill>
+                  <a:srgbClr val="000000"/>
+                </a:solidFill>
+                <a:effectLst/>
+                <a:latin typeface="Consolas" panose="020B0609020204030204" pitchFamily="49" charset="0"/>
+              </a:rPr>
+              <a:t>=</a:t>
+            </a:r>
+            <a:r>
+              <a:rPr lang="en-US" sz="1200" b="0" dirty="0">
+                <a:solidFill>
+                  <a:srgbClr val="A31515"/>
+                </a:solidFill>
+                <a:effectLst/>
+                <a:latin typeface="Consolas" panose="020B0609020204030204" pitchFamily="49" charset="0"/>
+              </a:rPr>
+              <a:t>"</a:t>
+            </a:r>
+            <a:r>
+              <a:rPr lang="en-US" sz="1200" b="0" dirty="0" err="1">
+                <a:solidFill>
+                  <a:srgbClr val="A31515"/>
+                </a:solidFill>
+                <a:effectLst/>
+                <a:latin typeface="Consolas" panose="020B0609020204030204" pitchFamily="49" charset="0"/>
+              </a:rPr>
+              <a:t>ridgeplot</a:t>
+            </a:r>
+            <a:r>
+              <a:rPr lang="en-US" sz="1200" b="0" dirty="0">
+                <a:solidFill>
+                  <a:srgbClr val="A31515"/>
+                </a:solidFill>
+                <a:effectLst/>
+                <a:latin typeface="Consolas" panose="020B0609020204030204" pitchFamily="49" charset="0"/>
+              </a:rPr>
+              <a:t>"</a:t>
+            </a:r>
+            <a:r>
+              <a:rPr lang="en-US" sz="1200" b="0" dirty="0">
+                <a:solidFill>
+                  <a:srgbClr val="3B3B3B"/>
+                </a:solidFill>
+                <a:effectLst/>
+                <a:latin typeface="Consolas" panose="020B0609020204030204" pitchFamily="49" charset="0"/>
+              </a:rPr>
+              <a:t>,</a:t>
+            </a:r>
+          </a:p>
+          <a:p>
+            <a:r>
+              <a:rPr lang="en-US" sz="1200" b="0" dirty="0">
+                <a:solidFill>
+                  <a:srgbClr val="3B3B3B"/>
+                </a:solidFill>
+                <a:effectLst/>
+                <a:latin typeface="Consolas" panose="020B0609020204030204" pitchFamily="49" charset="0"/>
+              </a:rPr>
+              <a:t>               </a:t>
+            </a:r>
+            <a:r>
+              <a:rPr lang="en-US" sz="1200" b="0" dirty="0">
+                <a:solidFill>
+                  <a:srgbClr val="001080"/>
+                </a:solidFill>
+                <a:effectLst/>
+                <a:latin typeface="Consolas" panose="020B0609020204030204" pitchFamily="49" charset="0"/>
+              </a:rPr>
+              <a:t>combined</a:t>
+            </a:r>
+            <a:r>
+              <a:rPr lang="en-US" sz="1200" b="0" dirty="0">
+                <a:solidFill>
+                  <a:srgbClr val="000000"/>
+                </a:solidFill>
+                <a:effectLst/>
+                <a:latin typeface="Consolas" panose="020B0609020204030204" pitchFamily="49" charset="0"/>
+              </a:rPr>
+              <a:t>=</a:t>
+            </a:r>
+            <a:r>
+              <a:rPr lang="en-US" sz="1200" b="0" dirty="0">
+                <a:solidFill>
+                  <a:srgbClr val="0000FF"/>
+                </a:solidFill>
+                <a:effectLst/>
+                <a:latin typeface="Consolas" panose="020B0609020204030204" pitchFamily="49" charset="0"/>
+              </a:rPr>
+              <a:t>True</a:t>
+            </a:r>
+            <a:r>
+              <a:rPr lang="en-US" sz="1200" b="0" dirty="0">
+                <a:solidFill>
+                  <a:srgbClr val="3B3B3B"/>
+                </a:solidFill>
+                <a:effectLst/>
+                <a:latin typeface="Consolas" panose="020B0609020204030204" pitchFamily="49" charset="0"/>
+              </a:rPr>
+              <a:t>, </a:t>
+            </a:r>
+            <a:r>
+              <a:rPr lang="en-US" sz="1200" b="0" dirty="0" err="1">
+                <a:solidFill>
+                  <a:srgbClr val="001080"/>
+                </a:solidFill>
+                <a:effectLst/>
+                <a:latin typeface="Consolas" panose="020B0609020204030204" pitchFamily="49" charset="0"/>
+              </a:rPr>
+              <a:t>figsize</a:t>
+            </a:r>
+            <a:r>
+              <a:rPr lang="en-US" sz="1200" b="0" dirty="0">
+                <a:solidFill>
+                  <a:srgbClr val="000000"/>
+                </a:solidFill>
+                <a:effectLst/>
+                <a:latin typeface="Consolas" panose="020B0609020204030204" pitchFamily="49" charset="0"/>
+              </a:rPr>
+              <a:t>=</a:t>
+            </a:r>
+            <a:r>
+              <a:rPr lang="en-US" sz="1200" b="0" dirty="0">
+                <a:solidFill>
+                  <a:srgbClr val="3B3B3B"/>
+                </a:solidFill>
+                <a:effectLst/>
+                <a:latin typeface="Consolas" panose="020B0609020204030204" pitchFamily="49" charset="0"/>
+              </a:rPr>
+              <a:t>(</a:t>
+            </a:r>
+            <a:r>
+              <a:rPr lang="en-US" sz="1200" b="0" dirty="0">
+                <a:solidFill>
+                  <a:srgbClr val="098658"/>
+                </a:solidFill>
+                <a:effectLst/>
+                <a:latin typeface="Consolas" panose="020B0609020204030204" pitchFamily="49" charset="0"/>
+              </a:rPr>
+              <a:t>6</a:t>
+            </a:r>
+            <a:r>
+              <a:rPr lang="en-US" sz="1200" b="0" dirty="0">
+                <a:solidFill>
+                  <a:srgbClr val="3B3B3B"/>
+                </a:solidFill>
+                <a:effectLst/>
+                <a:latin typeface="Consolas" panose="020B0609020204030204" pitchFamily="49" charset="0"/>
+              </a:rPr>
+              <a:t>, </a:t>
+            </a:r>
+            <a:r>
+              <a:rPr lang="en-US" sz="1200" b="0" dirty="0">
+                <a:solidFill>
+                  <a:srgbClr val="098658"/>
+                </a:solidFill>
+                <a:effectLst/>
+                <a:latin typeface="Consolas" panose="020B0609020204030204" pitchFamily="49" charset="0"/>
+              </a:rPr>
+              <a:t>4</a:t>
+            </a:r>
+            <a:r>
+              <a:rPr lang="en-US" sz="1200" b="0" dirty="0">
+                <a:solidFill>
+                  <a:srgbClr val="3B3B3B"/>
+                </a:solidFill>
+                <a:effectLst/>
+                <a:latin typeface="Consolas" panose="020B0609020204030204" pitchFamily="49" charset="0"/>
+              </a:rPr>
+              <a:t>))</a:t>
+            </a:r>
+          </a:p>
+        </p:txBody>
+      </p:sp>
+    </p:spTree>
+    <p:extLst>
+      <p:ext uri="{BB962C8B-B14F-4D97-AF65-F5344CB8AC3E}">
+        <p14:creationId xmlns:p14="http://schemas.microsoft.com/office/powerpoint/2010/main" val="2457012389"/>
+      </p:ext>
+    </p:extLst>
+  </p:cSld>
+  <p:clrMapOvr>
+    <a:masterClrMapping/>
+  </p:clrMapOvr>
+</p:sld>
+</file>
+
+<file path=ppt/slides/slide11.xml><?xml version="1.0" encoding="utf-8"?>
+<p:sld xmlns:a="http://schemas.openxmlformats.org/drawingml/2006/main" xmlns:r="http://schemas.openxmlformats.org/officeDocument/2006/relationships" xmlns:p="http://schemas.openxmlformats.org/presentationml/2006/main">
+  <p:cSld>
+    <p:spTree>
+      <p:nvGrpSpPr>
+        <p:cNvPr id="1" name=""/>
+        <p:cNvGrpSpPr/>
+        <p:nvPr/>
+      </p:nvGrpSpPr>
+      <p:grpSpPr>
+        <a:xfrm>
+          <a:off x="0" y="0"/>
+          <a:ext cx="0" cy="0"/>
+          <a:chOff x="0" y="0"/>
+          <a:chExt cx="0" cy="0"/>
+        </a:xfrm>
+      </p:grpSpPr>
+      <p:sp>
+        <p:nvSpPr>
+          <p:cNvPr id="2" name="Title 1">
+            <a:extLst>
+              <a:ext uri="{FF2B5EF4-FFF2-40B4-BE49-F238E27FC236}">
+                <a16:creationId xmlns:a16="http://schemas.microsoft.com/office/drawing/2014/main" id="{AE3DA5B9-09F1-8E77-2BF1-B3971A8157F2}"/>
+              </a:ext>
+            </a:extLst>
+          </p:cNvPr>
+          <p:cNvSpPr>
+            <a:spLocks noGrp="1"/>
+          </p:cNvSpPr>
+          <p:nvPr>
+            <p:ph type="title"/>
+          </p:nvPr>
+        </p:nvSpPr>
+        <p:spPr/>
+        <p:txBody>
+          <a:bodyPr/>
+          <a:lstStyle/>
+          <a:p>
+            <a:r>
+              <a:rPr lang="en-US" dirty="0"/>
+              <a:t>Partial pooling through hierarchical models</a:t>
+            </a:r>
+            <a:endParaRPr lang="en-IL" dirty="0"/>
+          </a:p>
+        </p:txBody>
+      </p:sp>
+      <p:sp>
+        <p:nvSpPr>
+          <p:cNvPr id="3" name="Content Placeholder 2">
+            <a:extLst>
+              <a:ext uri="{FF2B5EF4-FFF2-40B4-BE49-F238E27FC236}">
+                <a16:creationId xmlns:a16="http://schemas.microsoft.com/office/drawing/2014/main" id="{EA2DA62F-ABDC-EF1A-D097-E5A8FCA93D38}"/>
+              </a:ext>
+            </a:extLst>
+          </p:cNvPr>
+          <p:cNvSpPr>
+            <a:spLocks noGrp="1"/>
+          </p:cNvSpPr>
+          <p:nvPr>
+            <p:ph idx="1"/>
+          </p:nvPr>
+        </p:nvSpPr>
+        <p:spPr>
+          <a:xfrm>
+            <a:off x="838200" y="1825625"/>
+            <a:ext cx="10515600" cy="684310"/>
+          </a:xfrm>
+        </p:spPr>
+        <p:txBody>
+          <a:bodyPr/>
+          <a:lstStyle/>
+          <a:p>
+            <a:endParaRPr lang="en-IL"/>
+          </a:p>
+        </p:txBody>
+      </p:sp>
+      <p:sp>
+        <p:nvSpPr>
+          <p:cNvPr id="4" name="Slide Number Placeholder 3">
+            <a:extLst>
+              <a:ext uri="{FF2B5EF4-FFF2-40B4-BE49-F238E27FC236}">
+                <a16:creationId xmlns:a16="http://schemas.microsoft.com/office/drawing/2014/main" id="{C5D80F27-3EA6-79B2-F92E-ECCCA7C0C1D2}"/>
+              </a:ext>
+            </a:extLst>
+          </p:cNvPr>
+          <p:cNvSpPr>
+            <a:spLocks noGrp="1"/>
+          </p:cNvSpPr>
+          <p:nvPr>
+            <p:ph type="sldNum" sz="quarter" idx="12"/>
+          </p:nvPr>
+        </p:nvSpPr>
+        <p:spPr/>
+        <p:txBody>
+          <a:bodyPr/>
+          <a:lstStyle/>
+          <a:p>
+            <a:fld id="{E0DC7AD3-7C2E-418B-8082-788996B615FB}" type="slidenum">
+              <a:rPr lang="en-GB" smtClean="0"/>
+              <a:t>11</a:t>
+            </a:fld>
+            <a:endParaRPr lang="en-GB"/>
+          </a:p>
+        </p:txBody>
+      </p:sp>
+    </p:spTree>
+    <p:extLst>
+      <p:ext uri="{BB962C8B-B14F-4D97-AF65-F5344CB8AC3E}">
+        <p14:creationId xmlns:p14="http://schemas.microsoft.com/office/powerpoint/2010/main" val="3511360467"/>
+      </p:ext>
+    </p:extLst>
+  </p:cSld>
+  <p:clrMapOvr>
+    <a:masterClrMapping/>
+  </p:clrMapOvr>
+</p:sld>
+</file>
+
+<file path=ppt/slides/slide12.xml><?xml version="1.0" encoding="utf-8"?>
+<p:sld xmlns:a="http://schemas.openxmlformats.org/drawingml/2006/main" xmlns:r="http://schemas.openxmlformats.org/officeDocument/2006/relationships" xmlns:p="http://schemas.openxmlformats.org/presentationml/2006/main">
+  <p:cSld>
+    <p:spTree>
+      <p:nvGrpSpPr>
+        <p:cNvPr id="1" name="">
+          <a:extLst>
+            <a:ext uri="{FF2B5EF4-FFF2-40B4-BE49-F238E27FC236}">
+              <a16:creationId xmlns:a16="http://schemas.microsoft.com/office/drawing/2014/main" id="{93E079D9-98E9-685D-2EBF-44ABB96529E5}"/>
+            </a:ext>
+          </a:extLst>
+        </p:cNvPr>
+        <p:cNvGrpSpPr/>
+        <p:nvPr/>
+      </p:nvGrpSpPr>
+      <p:grpSpPr>
+        <a:xfrm>
+          <a:off x="0" y="0"/>
+          <a:ext cx="0" cy="0"/>
+          <a:chOff x="0" y="0"/>
+          <a:chExt cx="0" cy="0"/>
+        </a:xfrm>
+      </p:grpSpPr>
+      <p:sp>
+        <p:nvSpPr>
+          <p:cNvPr id="6" name="Title 5">
+            <a:extLst>
+              <a:ext uri="{FF2B5EF4-FFF2-40B4-BE49-F238E27FC236}">
+                <a16:creationId xmlns:a16="http://schemas.microsoft.com/office/drawing/2014/main" id="{63407B5E-4480-DDBF-E5BA-7784D447A90E}"/>
+              </a:ext>
+            </a:extLst>
+          </p:cNvPr>
+          <p:cNvSpPr>
+            <a:spLocks noGrp="1"/>
+          </p:cNvSpPr>
+          <p:nvPr>
+            <p:ph type="title"/>
+          </p:nvPr>
+        </p:nvSpPr>
+        <p:spPr/>
+        <p:txBody>
+          <a:bodyPr/>
+          <a:lstStyle/>
+          <a:p>
+            <a:endParaRPr lang="en-IL"/>
+          </a:p>
+        </p:txBody>
+      </p:sp>
+      <p:sp>
+        <p:nvSpPr>
+          <p:cNvPr id="7" name="Text Placeholder 6">
+            <a:extLst>
+              <a:ext uri="{FF2B5EF4-FFF2-40B4-BE49-F238E27FC236}">
+                <a16:creationId xmlns:a16="http://schemas.microsoft.com/office/drawing/2014/main" id="{96B0E2CF-1F1D-09B3-0E05-CF1D4FAF1171}"/>
+              </a:ext>
+            </a:extLst>
+          </p:cNvPr>
+          <p:cNvSpPr>
+            <a:spLocks noGrp="1"/>
+          </p:cNvSpPr>
+          <p:nvPr>
+            <p:ph type="body" idx="1"/>
+          </p:nvPr>
+        </p:nvSpPr>
+        <p:spPr/>
+        <p:txBody>
+          <a:bodyPr>
+            <a:normAutofit fontScale="85000" lnSpcReduction="10000"/>
+          </a:bodyPr>
+          <a:lstStyle/>
+          <a:p>
+            <a:pPr algn="ctr"/>
+            <a:r>
+              <a:rPr lang="en-US" sz="7200" dirty="0"/>
+              <a:t>7C Hierarchical models in </a:t>
+            </a:r>
+            <a:r>
+              <a:rPr lang="en-US" sz="7200" dirty="0" err="1"/>
+              <a:t>PyMC</a:t>
+            </a:r>
+            <a:endParaRPr lang="en-IL" sz="7200" dirty="0"/>
+          </a:p>
+        </p:txBody>
+      </p:sp>
+      <p:sp>
+        <p:nvSpPr>
+          <p:cNvPr id="5" name="Slide Number Placeholder 4">
+            <a:extLst>
+              <a:ext uri="{FF2B5EF4-FFF2-40B4-BE49-F238E27FC236}">
+                <a16:creationId xmlns:a16="http://schemas.microsoft.com/office/drawing/2014/main" id="{7268E480-A990-C4F0-A7AC-64DD9C2114F0}"/>
+              </a:ext>
+            </a:extLst>
+          </p:cNvPr>
+          <p:cNvSpPr>
+            <a:spLocks noGrp="1"/>
+          </p:cNvSpPr>
+          <p:nvPr>
+            <p:ph type="sldNum" sz="quarter" idx="12"/>
+          </p:nvPr>
+        </p:nvSpPr>
+        <p:spPr/>
+        <p:txBody>
+          <a:bodyPr/>
+          <a:lstStyle/>
+          <a:p>
+            <a:pPr>
+              <a:defRPr/>
+            </a:pPr>
+            <a:fld id="{3469EAC8-EFAD-49DA-A425-6225312A328A}" type="slidenum">
+              <a:rPr lang="he-IL" altLang="en-US" smtClean="0"/>
+              <a:pPr>
+                <a:defRPr/>
+              </a:pPr>
+              <a:t>12</a:t>
+            </a:fld>
+            <a:r>
+              <a:rPr lang="en-US" altLang="en-US"/>
+              <a:t> /  72</a:t>
+            </a:r>
+          </a:p>
+        </p:txBody>
+      </p:sp>
+    </p:spTree>
+    <p:extLst>
+      <p:ext uri="{BB962C8B-B14F-4D97-AF65-F5344CB8AC3E}">
+        <p14:creationId xmlns:p14="http://schemas.microsoft.com/office/powerpoint/2010/main" val="752095874"/>
+      </p:ext>
+    </p:extLst>
+  </p:cSld>
+  <p:clrMapOvr>
+    <a:masterClrMapping/>
+  </p:clrMapOvr>
+</p:sld>
+</file>
+
+<file path=ppt/slides/slide13.xml><?xml version="1.0" encoding="utf-8"?>
+<p:sld xmlns:a="http://schemas.openxmlformats.org/drawingml/2006/main" xmlns:r="http://schemas.openxmlformats.org/officeDocument/2006/relationships" xmlns:p="http://schemas.openxmlformats.org/presentationml/2006/main">
+  <p:cSld>
+    <p:spTree>
+      <p:nvGrpSpPr>
         <p:cNvPr id="1" name="">
           <a:extLst>
             <a:ext uri="{FF2B5EF4-FFF2-40B4-BE49-F238E27FC236}">
@@ -3530,7 +4496,7 @@
               <a:pPr>
                 <a:defRPr/>
               </a:pPr>
-              <a:t>10</a:t>
+              <a:t>13</a:t>
             </a:fld>
             <a:r>
               <a:rPr lang="en-US" altLang="en-US"/>
@@ -3552,7 +4518,7 @@
 </p:sld>
 </file>
 
-<file path=ppt/slides/slide11.xml><?xml version="1.0" encoding="utf-8"?>
+<file path=ppt/slides/slide14.xml><?xml version="1.0" encoding="utf-8"?>
 <p:sld xmlns:a="http://schemas.openxmlformats.org/drawingml/2006/main" xmlns:r="http://schemas.openxmlformats.org/officeDocument/2006/relationships" xmlns:p="http://schemas.openxmlformats.org/presentationml/2006/main">
   <p:cSld>
     <p:spTree>
@@ -3661,7 +4627,7 @@
               <a:pPr>
                 <a:defRPr/>
               </a:pPr>
-              <a:t>11</a:t>
+              <a:t>14</a:t>
             </a:fld>
             <a:r>
               <a:rPr lang="en-US" altLang="en-US"/>
@@ -3683,7 +4649,7 @@
 </p:sld>
 </file>
 
-<file path=ppt/slides/slide12.xml><?xml version="1.0" encoding="utf-8"?>
+<file path=ppt/slides/slide15.xml><?xml version="1.0" encoding="utf-8"?>
 <p:sld xmlns:a="http://schemas.openxmlformats.org/drawingml/2006/main" xmlns:r="http://schemas.openxmlformats.org/officeDocument/2006/relationships" xmlns:p="http://schemas.openxmlformats.org/presentationml/2006/main">
   <p:cSld>
     <p:spTree>
@@ -3792,7 +4758,7 @@
               <a:pPr>
                 <a:defRPr/>
               </a:pPr>
-              <a:t>12</a:t>
+              <a:t>15</a:t>
             </a:fld>
             <a:r>
               <a:rPr lang="en-US" altLang="en-US"/>
@@ -3814,7 +4780,7 @@
 </p:sld>
 </file>
 
-<file path=ppt/slides/slide13.xml><?xml version="1.0" encoding="utf-8"?>
+<file path=ppt/slides/slide16.xml><?xml version="1.0" encoding="utf-8"?>
 <p:sld xmlns:a="http://schemas.openxmlformats.org/drawingml/2006/main" xmlns:r="http://schemas.openxmlformats.org/officeDocument/2006/relationships" xmlns:p="http://schemas.openxmlformats.org/presentationml/2006/main">
   <p:cSld>
     <p:spTree>
@@ -3923,7 +4889,7 @@
               <a:pPr>
                 <a:defRPr/>
               </a:pPr>
-              <a:t>13</a:t>
+              <a:t>16</a:t>
             </a:fld>
             <a:r>
               <a:rPr lang="en-US" altLang="en-US"/>
@@ -3945,7 +4911,7 @@
 </p:sld>
 </file>
 
-<file path=ppt/slides/slide14.xml><?xml version="1.0" encoding="utf-8"?>
+<file path=ppt/slides/slide17.xml><?xml version="1.0" encoding="utf-8"?>
 <p:sld xmlns:a="http://schemas.openxmlformats.org/drawingml/2006/main" xmlns:r="http://schemas.openxmlformats.org/officeDocument/2006/relationships" xmlns:p="http://schemas.openxmlformats.org/presentationml/2006/main">
   <p:cSld>
     <p:spTree>
@@ -4054,7 +5020,7 @@
               <a:pPr>
                 <a:defRPr/>
               </a:pPr>
-              <a:t>14</a:t>
+              <a:t>17</a:t>
             </a:fld>
             <a:r>
               <a:rPr lang="en-US" altLang="en-US"/>
@@ -4675,10 +5641,10 @@
       </p:sp>
       <p:pic>
         <p:nvPicPr>
-          <p:cNvPr id="5" name="Picture 4">
+          <p:cNvPr id="7" name="Picture 6">
             <a:extLst>
               <a:ext uri="{FF2B5EF4-FFF2-40B4-BE49-F238E27FC236}">
-                <a16:creationId xmlns:a16="http://schemas.microsoft.com/office/drawing/2014/main" id="{EE4AA3E5-9126-276E-36CB-5814D10241BA}"/>
+                <a16:creationId xmlns:a16="http://schemas.microsoft.com/office/drawing/2014/main" id="{AAA0001F-0E82-7C73-82DF-9A0F630927D0}"/>
               </a:ext>
             </a:extLst>
           </p:cNvPr>
@@ -4700,8 +5666,8 @@
         </p:blipFill>
         <p:spPr>
           <a:xfrm>
-            <a:off x="5606253" y="3429000"/>
-            <a:ext cx="5143034" cy="3208499"/>
+            <a:off x="4380873" y="3472669"/>
+            <a:ext cx="6871845" cy="3016059"/>
           </a:xfrm>
           <a:prstGeom prst="rect">
             <a:avLst/>
@@ -5313,17 +6279,31 @@
         </p:nvSpPr>
         <p:spPr>
           <a:xfrm>
-            <a:off x="838200" y="365125"/>
-            <a:ext cx="3522435" cy="707895"/>
+            <a:off x="394995" y="319878"/>
+            <a:ext cx="5861180" cy="707895"/>
           </a:xfrm>
         </p:spPr>
         <p:txBody>
-          <a:bodyPr/>
+          <a:bodyPr>
+            <a:normAutofit fontScale="90000"/>
+          </a:bodyPr>
           <a:lstStyle/>
           <a:p>
             <a:r>
               <a:rPr lang="en-US" dirty="0"/>
-              <a:t>Tips data</a:t>
+              <a:t>Pooled and </a:t>
+            </a:r>
+            <a:r>
+              <a:rPr lang="en-US" dirty="0" err="1"/>
+              <a:t>unpooled</a:t>
+            </a:r>
+            <a:r>
+              <a:rPr lang="en-US" dirty="0"/>
+              <a:t> </a:t>
+            </a:r>
+            <a:r>
+              <a:rPr lang="en-US" dirty="0" err="1"/>
+              <a:t>PyMC</a:t>
             </a:r>
             <a:endParaRPr lang="en-IL" dirty="0"/>
           </a:p>
@@ -5348,7 +6328,7 @@
         <p:spPr>
           <a:xfrm>
             <a:off x="838200" y="1247646"/>
-            <a:ext cx="5730551" cy="1652490"/>
+            <a:ext cx="10022633" cy="885558"/>
           </a:xfrm>
         </p:spPr>
         <p:txBody>
@@ -5358,46 +6338,48 @@
           <a:lstStyle/>
           <a:p>
             <a:r>
+              <a:rPr lang="en-US" sz="2400" dirty="0" err="1"/>
+              <a:t>PyMC</a:t>
+            </a:r>
+            <a:r>
               <a:rPr lang="en-US" sz="2400" dirty="0"/>
-              <a:t>4 groups</a:t>
-            </a:r>
-          </a:p>
-          <a:p>
-            <a:r>
-              <a:rPr lang="en-US" sz="2400" dirty="0"/>
-              <a:t>Pooled and </a:t>
-            </a:r>
-            <a:r>
-              <a:rPr lang="en-US" sz="2400" dirty="0" err="1"/>
-              <a:t>unpooled</a:t>
-            </a:r>
-            <a:r>
-              <a:rPr lang="en-US" sz="2400" dirty="0"/>
-              <a:t> models are possible</a:t>
-            </a:r>
+              <a:t> would accept a vector for </a:t>
+            </a:r>
+            <a:r>
+              <a:rPr lang="en-US" sz="2400" dirty="0">
+                <a:latin typeface="Courier New" panose="02070309020205020404" pitchFamily="49" charset="0"/>
+                <a:cs typeface="Courier New" panose="02070309020205020404" pitchFamily="49" charset="0"/>
+              </a:rPr>
+              <a:t>sigma</a:t>
+            </a:r>
+            <a:r>
+              <a:rPr lang="en-US" sz="2400" dirty="0">
+                <a:cs typeface="Courier New" panose="02070309020205020404" pitchFamily="49" charset="0"/>
+              </a:rPr>
+              <a:t> in the </a:t>
+            </a:r>
+            <a:r>
+              <a:rPr lang="en-US" sz="2400" dirty="0" err="1">
+                <a:latin typeface="Courier New" panose="02070309020205020404" pitchFamily="49" charset="0"/>
+                <a:cs typeface="Courier New" panose="02070309020205020404" pitchFamily="49" charset="0"/>
+              </a:rPr>
+              <a:t>HalfNormal</a:t>
+            </a:r>
+            <a:endParaRPr lang="en-US" sz="2400" dirty="0">
+              <a:cs typeface="Courier New" panose="02070309020205020404" pitchFamily="49" charset="0"/>
+            </a:endParaRPr>
           </a:p>
           <a:p>
             <a:pPr lvl="1"/>
             <a:r>
-              <a:rPr lang="en-US" sz="2000" dirty="0"/>
-              <a:t>The </a:t>
-            </a:r>
-            <a:r>
-              <a:rPr lang="en-US" sz="2000" dirty="0" err="1"/>
-              <a:t>unpooled</a:t>
-            </a:r>
-            <a:r>
-              <a:rPr lang="en-US" sz="2000" dirty="0"/>
-              <a:t> model seems to have 1 prior</a:t>
-            </a:r>
-          </a:p>
-          <a:p>
-            <a:pPr lvl="2"/>
-            <a:r>
-              <a:rPr lang="en-US" sz="1800" dirty="0"/>
-              <a:t>But it is really 4 identical priors</a:t>
-            </a:r>
-            <a:endParaRPr lang="en-IL" sz="1800" dirty="0"/>
+              <a:rPr lang="en-US" sz="2000" dirty="0">
+                <a:cs typeface="Courier New" panose="02070309020205020404" pitchFamily="49" charset="0"/>
+              </a:rPr>
+              <a:t>They really are different priors</a:t>
+            </a:r>
+            <a:endParaRPr lang="en-IL" sz="2000" dirty="0">
+              <a:cs typeface="Courier New" panose="02070309020205020404" pitchFamily="49" charset="0"/>
+            </a:endParaRPr>
           </a:p>
         </p:txBody>
       </p:sp>
@@ -5430,36 +6412,6 @@
           </a:p>
         </p:txBody>
       </p:sp>
-      <p:pic>
-        <p:nvPicPr>
-          <p:cNvPr id="5" name="Picture 4">
-            <a:extLst>
-              <a:ext uri="{FF2B5EF4-FFF2-40B4-BE49-F238E27FC236}">
-                <a16:creationId xmlns:a16="http://schemas.microsoft.com/office/drawing/2014/main" id="{465A60F9-0103-81FC-9F27-2E9FD80806B2}"/>
-              </a:ext>
-            </a:extLst>
-          </p:cNvPr>
-          <p:cNvPicPr>
-            <a:picLocks noChangeAspect="1"/>
-          </p:cNvPicPr>
-          <p:nvPr/>
-        </p:nvPicPr>
-        <p:blipFill>
-          <a:blip r:embed="rId2"/>
-          <a:stretch>
-            <a:fillRect/>
-          </a:stretch>
-        </p:blipFill>
-        <p:spPr>
-          <a:xfrm>
-            <a:off x="6400800" y="70867"/>
-            <a:ext cx="5529943" cy="2249880"/>
-          </a:xfrm>
-          <a:prstGeom prst="rect">
-            <a:avLst/>
-          </a:prstGeom>
-        </p:spPr>
-      </p:pic>
       <p:sp>
         <p:nvSpPr>
           <p:cNvPr id="8" name="TextBox 7">
@@ -7252,165 +8204,6 @@
   <p:clrMapOvr>
     <a:masterClrMapping/>
   </p:clrMapOvr>
-  <p:timing>
-    <p:tnLst>
-      <p:par>
-        <p:cTn id="1" dur="indefinite" restart="never" nodeType="tmRoot">
-          <p:childTnLst>
-            <p:seq concurrent="1" nextAc="seek">
-              <p:cTn id="2" dur="indefinite" nodeType="mainSeq">
-                <p:childTnLst>
-                  <p:par>
-                    <p:cTn id="3" fill="hold">
-                      <p:stCondLst>
-                        <p:cond delay="indefinite"/>
-                      </p:stCondLst>
-                      <p:childTnLst>
-                        <p:par>
-                          <p:cTn id="4" fill="hold">
-                            <p:stCondLst>
-                              <p:cond delay="0"/>
-                            </p:stCondLst>
-                            <p:childTnLst>
-                              <p:par>
-                                <p:cTn id="5" presetID="1" presetClass="entr" presetSubtype="0" fill="hold" nodeType="clickEffect">
-                                  <p:stCondLst>
-                                    <p:cond delay="0"/>
-                                  </p:stCondLst>
-                                  <p:childTnLst>
-                                    <p:set>
-                                      <p:cBhvr>
-                                        <p:cTn id="6" dur="1" fill="hold">
-                                          <p:stCondLst>
-                                            <p:cond delay="0"/>
-                                          </p:stCondLst>
-                                        </p:cTn>
-                                        <p:tgtEl>
-                                          <p:spTgt spid="3">
-                                            <p:txEl>
-                                              <p:pRg st="1" end="1"/>
-                                            </p:txEl>
-                                          </p:spTgt>
-                                        </p:tgtEl>
-                                        <p:attrNameLst>
-                                          <p:attrName>style.visibility</p:attrName>
-                                        </p:attrNameLst>
-                                      </p:cBhvr>
-                                      <p:to>
-                                        <p:strVal val="visible"/>
-                                      </p:to>
-                                    </p:set>
-                                  </p:childTnLst>
-                                </p:cTn>
-                              </p:par>
-                            </p:childTnLst>
-                          </p:cTn>
-                        </p:par>
-                      </p:childTnLst>
-                    </p:cTn>
-                  </p:par>
-                  <p:par>
-                    <p:cTn id="7" fill="hold">
-                      <p:stCondLst>
-                        <p:cond delay="indefinite"/>
-                      </p:stCondLst>
-                      <p:childTnLst>
-                        <p:par>
-                          <p:cTn id="8" fill="hold">
-                            <p:stCondLst>
-                              <p:cond delay="0"/>
-                            </p:stCondLst>
-                            <p:childTnLst>
-                              <p:par>
-                                <p:cTn id="9" presetID="1" presetClass="entr" presetSubtype="0" fill="hold" nodeType="clickEffect">
-                                  <p:stCondLst>
-                                    <p:cond delay="0"/>
-                                  </p:stCondLst>
-                                  <p:childTnLst>
-                                    <p:set>
-                                      <p:cBhvr>
-                                        <p:cTn id="10" dur="1" fill="hold">
-                                          <p:stCondLst>
-                                            <p:cond delay="0"/>
-                                          </p:stCondLst>
-                                        </p:cTn>
-                                        <p:tgtEl>
-                                          <p:spTgt spid="3">
-                                            <p:txEl>
-                                              <p:pRg st="2" end="2"/>
-                                            </p:txEl>
-                                          </p:spTgt>
-                                        </p:tgtEl>
-                                        <p:attrNameLst>
-                                          <p:attrName>style.visibility</p:attrName>
-                                        </p:attrNameLst>
-                                      </p:cBhvr>
-                                      <p:to>
-                                        <p:strVal val="visible"/>
-                                      </p:to>
-                                    </p:set>
-                                  </p:childTnLst>
-                                </p:cTn>
-                              </p:par>
-                              <p:par>
-                                <p:cTn id="11" presetID="1" presetClass="entr" presetSubtype="0" fill="hold" nodeType="withEffect">
-                                  <p:stCondLst>
-                                    <p:cond delay="0"/>
-                                  </p:stCondLst>
-                                  <p:childTnLst>
-                                    <p:set>
-                                      <p:cBhvr>
-                                        <p:cTn id="12" dur="1" fill="hold">
-                                          <p:stCondLst>
-                                            <p:cond delay="0"/>
-                                          </p:stCondLst>
-                                        </p:cTn>
-                                        <p:tgtEl>
-                                          <p:spTgt spid="3">
-                                            <p:txEl>
-                                              <p:pRg st="3" end="3"/>
-                                            </p:txEl>
-                                          </p:spTgt>
-                                        </p:tgtEl>
-                                        <p:attrNameLst>
-                                          <p:attrName>style.visibility</p:attrName>
-                                        </p:attrNameLst>
-                                      </p:cBhvr>
-                                      <p:to>
-                                        <p:strVal val="visible"/>
-                                      </p:to>
-                                    </p:set>
-                                  </p:childTnLst>
-                                </p:cTn>
-                              </p:par>
-                            </p:childTnLst>
-                          </p:cTn>
-                        </p:par>
-                      </p:childTnLst>
-                    </p:cTn>
-                  </p:par>
-                </p:childTnLst>
-              </p:cTn>
-              <p:prevCondLst>
-                <p:cond evt="onPrev" delay="0">
-                  <p:tgtEl>
-                    <p:sldTgt/>
-                  </p:tgtEl>
-                </p:cond>
-              </p:prevCondLst>
-              <p:nextCondLst>
-                <p:cond evt="onNext" delay="0">
-                  <p:tgtEl>
-                    <p:sldTgt/>
-                  </p:tgtEl>
-                </p:cond>
-              </p:nextCondLst>
-            </p:seq>
-          </p:childTnLst>
-        </p:cTn>
-      </p:par>
-    </p:tnLst>
-  </p:timing>
 </p:sld>
 </file>
 
@@ -7455,19 +8248,29 @@
         </p:nvSpPr>
         <p:spPr>
           <a:xfrm>
-            <a:off x="838200" y="365125"/>
-            <a:ext cx="3522435" cy="707895"/>
+            <a:off x="261257" y="365125"/>
+            <a:ext cx="6139543" cy="707895"/>
           </a:xfrm>
         </p:spPr>
         <p:txBody>
-          <a:bodyPr/>
-          <a:lstStyle/>
-          <a:p>
-            <a:r>
-              <a:rPr lang="en-US" dirty="0"/>
-              <a:t>Tips data</a:t>
-            </a:r>
-            <a:endParaRPr lang="en-IL" dirty="0"/>
+          <a:bodyPr>
+            <a:noAutofit/>
+          </a:bodyPr>
+          <a:lstStyle/>
+          <a:p>
+            <a:r>
+              <a:rPr lang="en-US" sz="3600" dirty="0"/>
+              <a:t>Pooled and </a:t>
+            </a:r>
+            <a:r>
+              <a:rPr lang="en-US" sz="3600" dirty="0" err="1"/>
+              <a:t>unpooled</a:t>
+            </a:r>
+            <a:r>
+              <a:rPr lang="en-US" sz="3600" dirty="0"/>
+              <a:t> posteriors</a:t>
+            </a:r>
+            <a:endParaRPr lang="en-IL" sz="3600" dirty="0"/>
           </a:p>
         </p:txBody>
       </p:sp>
@@ -7490,56 +8293,58 @@
         <p:spPr>
           <a:xfrm>
             <a:off x="838200" y="1247646"/>
-            <a:ext cx="5730551" cy="1652490"/>
+            <a:ext cx="5730551" cy="2118178"/>
           </a:xfrm>
         </p:spPr>
         <p:txBody>
           <a:bodyPr>
-            <a:normAutofit/>
+            <a:normAutofit lnSpcReduction="10000"/>
           </a:bodyPr>
           <a:lstStyle/>
           <a:p>
             <a:r>
               <a:rPr lang="en-US" sz="2400" dirty="0"/>
-              <a:t>4 groups</a:t>
-            </a:r>
-          </a:p>
-          <a:p>
+              <a:t>Pooled model</a:t>
+            </a:r>
+          </a:p>
+          <a:p>
+            <a:pPr lvl="1"/>
+            <a:r>
+              <a:rPr lang="en-US" sz="2000" dirty="0"/>
+              <a:t>Less uncertainty</a:t>
+            </a:r>
+          </a:p>
+          <a:p>
+            <a:pPr lvl="2"/>
+            <a:r>
+              <a:rPr lang="en-US" sz="1600" dirty="0"/>
+              <a:t>Shared information</a:t>
+            </a:r>
+          </a:p>
+          <a:p>
+            <a:r>
+              <a:rPr lang="en-US" sz="2400" dirty="0" err="1"/>
+              <a:t>Unpooled</a:t>
+            </a:r>
             <a:r>
               <a:rPr lang="en-US" sz="2400" dirty="0"/>
-              <a:t>Pooled and </a:t>
-            </a:r>
-            <a:r>
-              <a:rPr lang="en-US" sz="2400" dirty="0" err="1"/>
-              <a:t>unpooled</a:t>
-            </a:r>
-            <a:r>
-              <a:rPr lang="en-US" sz="2400" dirty="0"/>
-              <a:t> models are possible</a:t>
+              <a:t> model</a:t>
             </a:r>
           </a:p>
           <a:p>
             <a:pPr lvl="1"/>
             <a:r>
               <a:rPr lang="en-US" sz="2000" dirty="0"/>
-              <a:t>The </a:t>
-            </a:r>
-            <a:r>
-              <a:rPr lang="en-US" sz="2000" dirty="0" err="1"/>
-              <a:t>unpooled</a:t>
-            </a:r>
-            <a:r>
-              <a:rPr lang="en-US" sz="2000" dirty="0"/>
-              <a:t> model seems to have 1 prior</a:t>
+              <a:t>Parameters for each group</a:t>
             </a:r>
           </a:p>
           <a:p>
             <a:pPr lvl="2"/>
             <a:r>
-              <a:rPr lang="en-US" sz="1800" dirty="0"/>
-              <a:t>But it is really 4 identical priors</a:t>
-            </a:r>
-            <a:endParaRPr lang="en-IL" sz="1800" dirty="0"/>
+              <a:rPr lang="en-US" sz="1600" dirty="0"/>
+              <a:t>Information is not pooled</a:t>
+            </a:r>
+            <a:endParaRPr lang="en-IL" sz="1600" dirty="0"/>
           </a:p>
         </p:txBody>
       </p:sp>
@@ -7617,15 +8422,20 @@
           <p:nvPr/>
         </p:nvPicPr>
         <p:blipFill>
-          <a:blip r:embed="rId3"/>
-          <a:stretch>
-            <a:fillRect/>
-          </a:stretch>
+          <a:blip r:embed="rId3" cstate="email">
+            <a:extLst>
+              <a:ext uri="{28A0092B-C50C-407E-A947-70E740481C1C}">
+                <a14:useLocalDpi xmlns:a14="http://schemas.microsoft.com/office/drawing/2010/main" val="0"/>
+              </a:ext>
+            </a:extLst>
+          </a:blip>
+          <a:srcRect/>
+          <a:stretch/>
         </p:blipFill>
         <p:spPr>
           <a:xfrm>
-            <a:off x="1651518" y="3059410"/>
-            <a:ext cx="9000931" cy="3662066"/>
+            <a:off x="2715208" y="3492176"/>
+            <a:ext cx="7937240" cy="3229299"/>
           </a:xfrm>
           <a:prstGeom prst="rect">
             <a:avLst/>
@@ -7642,165 +8452,6 @@
   <p:clrMapOvr>
     <a:masterClrMapping/>
   </p:clrMapOvr>
-  <p:timing>
-    <p:tnLst>
-      <p:par>
-        <p:cTn id="1" dur="indefinite" restart="never" nodeType="tmRoot">
-          <p:childTnLst>
-            <p:seq concurrent="1" nextAc="seek">
-              <p:cTn id="2" dur="indefinite" nodeType="mainSeq">
-                <p:childTnLst>
-                  <p:par>
-                    <p:cTn id="3" fill="hold">
-                      <p:stCondLst>
-                        <p:cond delay="indefinite"/>
-                      </p:stCondLst>
-                      <p:childTnLst>
-                        <p:par>
-                          <p:cTn id="4" fill="hold">
-                            <p:stCondLst>
-                              <p:cond delay="0"/>
-                            </p:stCondLst>
-                            <p:childTnLst>
-                              <p:par>
-                                <p:cTn id="5" presetID="1" presetClass="entr" presetSubtype="0" fill="hold" nodeType="clickEffect">
-                                  <p:stCondLst>
-                                    <p:cond delay="0"/>
-                                  </p:stCondLst>
-                                  <p:childTnLst>
-                                    <p:set>
-                                      <p:cBhvr>
-                                        <p:cTn id="6" dur="1" fill="hold">
-                                          <p:stCondLst>
-                                            <p:cond delay="0"/>
-                                          </p:stCondLst>
-                                        </p:cTn>
-                                        <p:tgtEl>
-                                          <p:spTgt spid="3">
-                                            <p:txEl>
-                                              <p:pRg st="1" end="1"/>
-                                            </p:txEl>
-                                          </p:spTgt>
-                                        </p:tgtEl>
-                                        <p:attrNameLst>
-                                          <p:attrName>style.visibility</p:attrName>
-                                        </p:attrNameLst>
-                                      </p:cBhvr>
-                                      <p:to>
-                                        <p:strVal val="visible"/>
-                                      </p:to>
-                                    </p:set>
-                                  </p:childTnLst>
-                                </p:cTn>
-                              </p:par>
-                            </p:childTnLst>
-                          </p:cTn>
-                        </p:par>
-                      </p:childTnLst>
-                    </p:cTn>
-                  </p:par>
-                  <p:par>
-                    <p:cTn id="7" fill="hold">
-                      <p:stCondLst>
-                        <p:cond delay="indefinite"/>
-                      </p:stCondLst>
-                      <p:childTnLst>
-                        <p:par>
-                          <p:cTn id="8" fill="hold">
-                            <p:stCondLst>
-                              <p:cond delay="0"/>
-                            </p:stCondLst>
-                            <p:childTnLst>
-                              <p:par>
-                                <p:cTn id="9" presetID="1" presetClass="entr" presetSubtype="0" fill="hold" nodeType="clickEffect">
-                                  <p:stCondLst>
-                                    <p:cond delay="0"/>
-                                  </p:stCondLst>
-                                  <p:childTnLst>
-                                    <p:set>
-                                      <p:cBhvr>
-                                        <p:cTn id="10" dur="1" fill="hold">
-                                          <p:stCondLst>
-                                            <p:cond delay="0"/>
-                                          </p:stCondLst>
-                                        </p:cTn>
-                                        <p:tgtEl>
-                                          <p:spTgt spid="3">
-                                            <p:txEl>
-                                              <p:pRg st="2" end="2"/>
-                                            </p:txEl>
-                                          </p:spTgt>
-                                        </p:tgtEl>
-                                        <p:attrNameLst>
-                                          <p:attrName>style.visibility</p:attrName>
-                                        </p:attrNameLst>
-                                      </p:cBhvr>
-                                      <p:to>
-                                        <p:strVal val="visible"/>
-                                      </p:to>
-                                    </p:set>
-                                  </p:childTnLst>
-                                </p:cTn>
-                              </p:par>
-                              <p:par>
-                                <p:cTn id="11" presetID="1" presetClass="entr" presetSubtype="0" fill="hold" nodeType="withEffect">
-                                  <p:stCondLst>
-                                    <p:cond delay="0"/>
-                                  </p:stCondLst>
-                                  <p:childTnLst>
-                                    <p:set>
-                                      <p:cBhvr>
-                                        <p:cTn id="12" dur="1" fill="hold">
-                                          <p:stCondLst>
-                                            <p:cond delay="0"/>
-                                          </p:stCondLst>
-                                        </p:cTn>
-                                        <p:tgtEl>
-                                          <p:spTgt spid="3">
-                                            <p:txEl>
-                                              <p:pRg st="3" end="3"/>
-                                            </p:txEl>
-                                          </p:spTgt>
-                                        </p:tgtEl>
-                                        <p:attrNameLst>
-                                          <p:attrName>style.visibility</p:attrName>
-                                        </p:attrNameLst>
-                                      </p:cBhvr>
-                                      <p:to>
-                                        <p:strVal val="visible"/>
-                                      </p:to>
-                                    </p:set>
-                                  </p:childTnLst>
-                                </p:cTn>
-                              </p:par>
-                            </p:childTnLst>
-                          </p:cTn>
-                        </p:par>
-                      </p:childTnLst>
-                    </p:cTn>
-                  </p:par>
-                </p:childTnLst>
-              </p:cTn>
-              <p:prevCondLst>
-                <p:cond evt="onPrev" delay="0">
-                  <p:tgtEl>
-                    <p:sldTgt/>
-                  </p:tgtEl>
-                </p:cond>
-              </p:prevCondLst>
-              <p:nextCondLst>
-                <p:cond evt="onNext" delay="0">
-                  <p:tgtEl>
-                    <p:sldTgt/>
-                  </p:tgtEl>
-                </p:cond>
-              </p:nextCondLst>
-            </p:seq>
-          </p:childTnLst>
-        </p:cTn>
-      </p:par>
-    </p:tnLst>
-  </p:timing>
 </p:sld>
 </file>
 
@@ -7809,13 +8460,7 @@
   <p:cSld>
     <p:spTree>
       <p:nvGrpSpPr>
-        <p:cNvPr id="1" name="">
-          <a:extLst>
-            <a:ext uri="{FF2B5EF4-FFF2-40B4-BE49-F238E27FC236}">
-              <a16:creationId xmlns:a16="http://schemas.microsoft.com/office/drawing/2014/main" id="{93E079D9-98E9-685D-2EBF-44ABB96529E5}"/>
-            </a:ext>
-          </a:extLst>
-        </p:cNvPr>
+        <p:cNvPr id="1" name=""/>
         <p:cNvGrpSpPr/>
         <p:nvPr/>
       </p:nvGrpSpPr>
@@ -7829,10 +8474,10 @@
       </p:grpSpPr>
       <p:sp>
         <p:nvSpPr>
-          <p:cNvPr id="6" name="Title 5">
+          <p:cNvPr id="2" name="Title 1">
             <a:extLst>
               <a:ext uri="{FF2B5EF4-FFF2-40B4-BE49-F238E27FC236}">
-                <a16:creationId xmlns:a16="http://schemas.microsoft.com/office/drawing/2014/main" id="{63407B5E-4480-DDBF-E5BA-7784D447A90E}"/>
+                <a16:creationId xmlns:a16="http://schemas.microsoft.com/office/drawing/2014/main" id="{1BADAC3D-360C-FE39-BDDF-E340B5A42E8A}"/>
               </a:ext>
             </a:extLst>
           </p:cNvPr>
@@ -7848,16 +8493,20 @@
           <a:bodyPr/>
           <a:lstStyle/>
           <a:p>
-            <a:endParaRPr lang="en-IL"/>
-          </a:p>
-        </p:txBody>
-      </p:sp>
-      <p:sp>
-        <p:nvSpPr>
-          <p:cNvPr id="7" name="Text Placeholder 6">
+            <a:r>
+              <a:rPr lang="en-US" dirty="0"/>
+              <a:t>Partial pooling</a:t>
+            </a:r>
+            <a:endParaRPr lang="en-IL" dirty="0"/>
+          </a:p>
+        </p:txBody>
+      </p:sp>
+      <p:sp>
+        <p:nvSpPr>
+          <p:cNvPr id="3" name="Content Placeholder 2">
             <a:extLst>
               <a:ext uri="{FF2B5EF4-FFF2-40B4-BE49-F238E27FC236}">
-                <a16:creationId xmlns:a16="http://schemas.microsoft.com/office/drawing/2014/main" id="{96B0E2CF-1F1D-09B3-0E05-CF1D4FAF1171}"/>
+                <a16:creationId xmlns:a16="http://schemas.microsoft.com/office/drawing/2014/main" id="{A9E6D4AA-5A5F-0295-CC37-6B7A91DB9D46}"/>
               </a:ext>
             </a:extLst>
           </p:cNvPr>
@@ -7865,35 +8514,39 @@
             <a:spLocks noGrp="1"/>
           </p:cNvSpPr>
           <p:nvPr>
-            <p:ph type="body" idx="1"/>
-          </p:nvPr>
-        </p:nvSpPr>
-        <p:spPr/>
-        <p:txBody>
-          <a:bodyPr>
-            <a:normAutofit fontScale="85000" lnSpcReduction="10000"/>
-          </a:bodyPr>
-          <a:lstStyle/>
-          <a:p>
-            <a:pPr algn="ctr"/>
-            <a:r>
-              <a:rPr lang="en-US" sz="7200" dirty="0"/>
-              <a:t>7C Hierarchical models in </a:t>
-            </a:r>
-            <a:r>
-              <a:rPr lang="en-US" sz="7200" dirty="0" err="1"/>
-              <a:t>PyMC</a:t>
-            </a:r>
-            <a:endParaRPr lang="en-IL" sz="7200" dirty="0"/>
-          </a:p>
-        </p:txBody>
-      </p:sp>
-      <p:sp>
-        <p:nvSpPr>
-          <p:cNvPr id="5" name="Slide Number Placeholder 4">
+            <p:ph idx="1"/>
+          </p:nvPr>
+        </p:nvSpPr>
+        <p:spPr>
+          <a:xfrm>
+            <a:off x="838200" y="1460500"/>
+            <a:ext cx="10515600" cy="1150840"/>
+          </a:xfrm>
+        </p:spPr>
+        <p:txBody>
+          <a:bodyPr/>
+          <a:lstStyle/>
+          <a:p>
+            <a:r>
+              <a:rPr lang="en-US" dirty="0"/>
+              <a:t>Information sharing across groups</a:t>
+            </a:r>
+          </a:p>
+          <a:p>
+            <a:r>
+              <a:rPr lang="en-US" dirty="0"/>
+              <a:t>Separate parameters for each group</a:t>
+            </a:r>
+            <a:endParaRPr lang="en-IL" dirty="0"/>
+          </a:p>
+        </p:txBody>
+      </p:sp>
+      <p:sp>
+        <p:nvSpPr>
+          <p:cNvPr id="4" name="Slide Number Placeholder 3">
             <a:extLst>
               <a:ext uri="{FF2B5EF4-FFF2-40B4-BE49-F238E27FC236}">
-                <a16:creationId xmlns:a16="http://schemas.microsoft.com/office/drawing/2014/main" id="{7268E480-A990-C4F0-A7AC-64DD9C2114F0}"/>
+                <a16:creationId xmlns:a16="http://schemas.microsoft.com/office/drawing/2014/main" id="{0C131601-C031-3A9E-C259-C22B6028CED6}"/>
               </a:ext>
             </a:extLst>
           </p:cNvPr>
@@ -7909,27 +8562,53 @@
           <a:bodyPr/>
           <a:lstStyle/>
           <a:p>
-            <a:pPr>
-              <a:defRPr/>
-            </a:pPr>
-            <a:fld id="{3469EAC8-EFAD-49DA-A425-6225312A328A}" type="slidenum">
-              <a:rPr lang="he-IL" altLang="en-US" smtClean="0"/>
-              <a:pPr>
-                <a:defRPr/>
-              </a:pPr>
+            <a:fld id="{E0DC7AD3-7C2E-418B-8082-788996B615FB}" type="slidenum">
+              <a:rPr lang="en-GB" smtClean="0"/>
               <a:t>9</a:t>
             </a:fld>
-            <a:r>
-              <a:rPr lang="en-US" altLang="en-US"/>
-              <a:t> /  72</a:t>
-            </a:r>
-          </a:p>
-        </p:txBody>
-      </p:sp>
+            <a:endParaRPr lang="en-GB"/>
+          </a:p>
+        </p:txBody>
+      </p:sp>
+      <p:pic>
+        <p:nvPicPr>
+          <p:cNvPr id="5" name="Picture 4">
+            <a:extLst>
+              <a:ext uri="{FF2B5EF4-FFF2-40B4-BE49-F238E27FC236}">
+                <a16:creationId xmlns:a16="http://schemas.microsoft.com/office/drawing/2014/main" id="{DC82B9CF-FCEB-C9CB-CC43-0976EFDA6146}"/>
+              </a:ext>
+            </a:extLst>
+          </p:cNvPr>
+          <p:cNvPicPr>
+            <a:picLocks noChangeAspect="1"/>
+          </p:cNvPicPr>
+          <p:nvPr/>
+        </p:nvPicPr>
+        <p:blipFill>
+          <a:blip r:embed="rId2" cstate="email">
+            <a:extLst>
+              <a:ext uri="{28A0092B-C50C-407E-A947-70E740481C1C}">
+                <a14:useLocalDpi xmlns:a14="http://schemas.microsoft.com/office/drawing/2010/main" val="0"/>
+              </a:ext>
+            </a:extLst>
+          </a:blip>
+          <a:srcRect/>
+          <a:stretch/>
+        </p:blipFill>
+        <p:spPr>
+          <a:xfrm>
+            <a:off x="1074576" y="2864581"/>
+            <a:ext cx="10279224" cy="3491768"/>
+          </a:xfrm>
+          <a:prstGeom prst="rect">
+            <a:avLst/>
+          </a:prstGeom>
+        </p:spPr>
+      </p:pic>
     </p:spTree>
     <p:extLst>
       <p:ext uri="{BB962C8B-B14F-4D97-AF65-F5344CB8AC3E}">
-        <p14:creationId xmlns:p14="http://schemas.microsoft.com/office/powerpoint/2010/main" val="752095874"/>
+        <p14:creationId xmlns:p14="http://schemas.microsoft.com/office/powerpoint/2010/main" val="247865645"/>
       </p:ext>
     </p:extLst>
   </p:cSld>

</xml_diff>